<commit_message>
Updated ReadMe, Updated ppt
</commit_message>
<xml_diff>
--- a/_presentations/Lean3-Doguhan.pptx
+++ b/_presentations/Lean3-Doguhan.pptx
@@ -5,10 +5,10 @@
     <p:sldMasterId id="2147483660" r:id="rId1"/>
   </p:sldMasterIdLst>
   <p:notesMasterIdLst>
-    <p:notesMasterId r:id="rId29"/>
+    <p:notesMasterId r:id="rId33"/>
   </p:notesMasterIdLst>
   <p:handoutMasterIdLst>
-    <p:handoutMasterId r:id="rId30"/>
+    <p:handoutMasterId r:id="rId34"/>
   </p:handoutMasterIdLst>
   <p:sldIdLst>
     <p:sldId id="283" r:id="rId2"/>
@@ -19,25 +19,29 @@
     <p:sldId id="266" r:id="rId7"/>
     <p:sldId id="276" r:id="rId8"/>
     <p:sldId id="268" r:id="rId9"/>
-    <p:sldId id="267" r:id="rId10"/>
-    <p:sldId id="269" r:id="rId11"/>
-    <p:sldId id="272" r:id="rId12"/>
-    <p:sldId id="270" r:id="rId13"/>
-    <p:sldId id="271" r:id="rId14"/>
-    <p:sldId id="275" r:id="rId15"/>
-    <p:sldId id="274" r:id="rId16"/>
-    <p:sldId id="277" r:id="rId17"/>
-    <p:sldId id="261" r:id="rId18"/>
-    <p:sldId id="265" r:id="rId19"/>
-    <p:sldId id="278" r:id="rId20"/>
-    <p:sldId id="279" r:id="rId21"/>
-    <p:sldId id="280" r:id="rId22"/>
-    <p:sldId id="281" r:id="rId23"/>
-    <p:sldId id="282" r:id="rId24"/>
-    <p:sldId id="260" r:id="rId25"/>
-    <p:sldId id="284" r:id="rId26"/>
-    <p:sldId id="285" r:id="rId27"/>
-    <p:sldId id="259" r:id="rId28"/>
+    <p:sldId id="288" r:id="rId10"/>
+    <p:sldId id="287" r:id="rId11"/>
+    <p:sldId id="286" r:id="rId12"/>
+    <p:sldId id="267" r:id="rId13"/>
+    <p:sldId id="269" r:id="rId14"/>
+    <p:sldId id="272" r:id="rId15"/>
+    <p:sldId id="270" r:id="rId16"/>
+    <p:sldId id="271" r:id="rId17"/>
+    <p:sldId id="275" r:id="rId18"/>
+    <p:sldId id="274" r:id="rId19"/>
+    <p:sldId id="277" r:id="rId20"/>
+    <p:sldId id="261" r:id="rId21"/>
+    <p:sldId id="265" r:id="rId22"/>
+    <p:sldId id="278" r:id="rId23"/>
+    <p:sldId id="279" r:id="rId24"/>
+    <p:sldId id="280" r:id="rId25"/>
+    <p:sldId id="281" r:id="rId26"/>
+    <p:sldId id="289" r:id="rId27"/>
+    <p:sldId id="282" r:id="rId28"/>
+    <p:sldId id="260" r:id="rId29"/>
+    <p:sldId id="284" r:id="rId30"/>
+    <p:sldId id="285" r:id="rId31"/>
+    <p:sldId id="259" r:id="rId32"/>
   </p:sldIdLst>
   <p:sldSz cx="12192000" cy="6858000"/>
   <p:notesSz cx="9144000" cy="6858000"/>
@@ -138,7 +142,7 @@
   </p:defaultTextStyle>
   <p:extLst>
     <p:ext uri="{EFAFB233-063F-42B5-8137-9DF3F51BA10A}">
-      <p15:sldGuideLst xmlns:p15="http://schemas.microsoft.com/office/powerpoint/2012/main" xmlns="">
+      <p15:sldGuideLst xmlns:p15="http://schemas.microsoft.com/office/powerpoint/2012/main">
         <p15:guide id="1" orient="horz" pos="2160">
           <p15:clr>
             <a:srgbClr val="A4A3A4"/>
@@ -4776,7 +4780,7 @@
           <a:p>
             <a:fld id="{FD3D3B17-36C1-4CEB-8E22-C88517706ADF}" type="slidenum">
               <a:rPr lang="en-US" smtClean="0"/>
-              <a:t>9</a:t>
+              <a:t>12</a:t>
             </a:fld>
             <a:endParaRPr lang="en-US"/>
           </a:p>
@@ -4988,7 +4992,7 @@
           <a:p>
             <a:fld id="{FD3D3B17-36C1-4CEB-8E22-C88517706ADF}" type="slidenum">
               <a:rPr lang="en-US" smtClean="0"/>
-              <a:t>18</a:t>
+              <a:t>21</a:t>
             </a:fld>
             <a:endParaRPr lang="en-US"/>
           </a:p>
@@ -5100,7 +5104,7 @@
           <a:p>
             <a:fld id="{FD3D3B17-36C1-4CEB-8E22-C88517706ADF}" type="slidenum">
               <a:rPr lang="en-US" smtClean="0"/>
-              <a:t>23</a:t>
+              <a:t>27</a:t>
             </a:fld>
             <a:endParaRPr lang="en-US"/>
           </a:p>
@@ -6293,6 +6297,319 @@
             <p:ph type="title"/>
           </p:nvPr>
         </p:nvSpPr>
+        <p:spPr>
+          <a:xfrm>
+            <a:off x="812800" y="274638"/>
+            <a:ext cx="10668000" cy="768551"/>
+          </a:xfrm>
+        </p:spPr>
+        <p:txBody>
+          <a:bodyPr/>
+          <a:lstStyle/>
+          <a:p>
+            <a:r>
+              <a:rPr lang="en-US" dirty="0" smtClean="0"/>
+              <a:t>Project Structure</a:t>
+            </a:r>
+            <a:endParaRPr lang="en-US" dirty="0"/>
+          </a:p>
+        </p:txBody>
+      </p:sp>
+      <p:pic>
+        <p:nvPicPr>
+          <p:cNvPr id="8" name="Picture 7"/>
+          <p:cNvPicPr>
+            <a:picLocks noChangeAspect="1"/>
+          </p:cNvPicPr>
+          <p:nvPr/>
+        </p:nvPicPr>
+        <p:blipFill>
+          <a:blip r:embed="rId2"/>
+          <a:stretch>
+            <a:fillRect/>
+          </a:stretch>
+        </p:blipFill>
+        <p:spPr>
+          <a:xfrm>
+            <a:off x="4107287" y="1043189"/>
+            <a:ext cx="4070798" cy="5583957"/>
+          </a:xfrm>
+          <a:prstGeom prst="rect">
+            <a:avLst/>
+          </a:prstGeom>
+        </p:spPr>
+      </p:pic>
+    </p:spTree>
+    <p:extLst>
+      <p:ext uri="{BB962C8B-B14F-4D97-AF65-F5344CB8AC3E}">
+        <p14:creationId xmlns:p14="http://schemas.microsoft.com/office/powerpoint/2010/main" val="1592782031"/>
+      </p:ext>
+    </p:extLst>
+  </p:cSld>
+  <p:clrMapOvr>
+    <a:masterClrMapping/>
+  </p:clrMapOvr>
+</p:sld>
+</file>
+
+<file path=ppt/slides/slide11.xml><?xml version="1.0" encoding="utf-8"?>
+<p:sld xmlns:a="http://schemas.openxmlformats.org/drawingml/2006/main" xmlns:r="http://schemas.openxmlformats.org/officeDocument/2006/relationships" xmlns:p="http://schemas.openxmlformats.org/presentationml/2006/main">
+  <p:cSld>
+    <p:spTree>
+      <p:nvGrpSpPr>
+        <p:cNvPr id="1" name=""/>
+        <p:cNvGrpSpPr/>
+        <p:nvPr/>
+      </p:nvGrpSpPr>
+      <p:grpSpPr>
+        <a:xfrm>
+          <a:off x="0" y="0"/>
+          <a:ext cx="0" cy="0"/>
+          <a:chOff x="0" y="0"/>
+          <a:chExt cx="0" cy="0"/>
+        </a:xfrm>
+      </p:grpSpPr>
+      <p:sp>
+        <p:nvSpPr>
+          <p:cNvPr id="2" name="Title 1"/>
+          <p:cNvSpPr>
+            <a:spLocks noGrp="1"/>
+          </p:cNvSpPr>
+          <p:nvPr>
+            <p:ph type="title"/>
+          </p:nvPr>
+        </p:nvSpPr>
+        <p:spPr>
+          <a:xfrm>
+            <a:off x="812800" y="274638"/>
+            <a:ext cx="10668000" cy="742793"/>
+          </a:xfrm>
+        </p:spPr>
+        <p:txBody>
+          <a:bodyPr/>
+          <a:lstStyle/>
+          <a:p>
+            <a:r>
+              <a:rPr lang="en-US" dirty="0"/>
+              <a:t>Project Structure</a:t>
+            </a:r>
+          </a:p>
+        </p:txBody>
+      </p:sp>
+      <p:pic>
+        <p:nvPicPr>
+          <p:cNvPr id="4" name="Picture 3"/>
+          <p:cNvPicPr>
+            <a:picLocks noChangeAspect="1"/>
+          </p:cNvPicPr>
+          <p:nvPr/>
+        </p:nvPicPr>
+        <p:blipFill>
+          <a:blip r:embed="rId2"/>
+          <a:stretch>
+            <a:fillRect/>
+          </a:stretch>
+        </p:blipFill>
+        <p:spPr>
+          <a:xfrm>
+            <a:off x="4214566" y="1350329"/>
+            <a:ext cx="3628668" cy="4364672"/>
+          </a:xfrm>
+          <a:prstGeom prst="rect">
+            <a:avLst/>
+          </a:prstGeom>
+        </p:spPr>
+      </p:pic>
+    </p:spTree>
+    <p:extLst>
+      <p:ext uri="{BB962C8B-B14F-4D97-AF65-F5344CB8AC3E}">
+        <p14:creationId xmlns:p14="http://schemas.microsoft.com/office/powerpoint/2010/main" val="1576661795"/>
+      </p:ext>
+    </p:extLst>
+  </p:cSld>
+  <p:clrMapOvr>
+    <a:masterClrMapping/>
+  </p:clrMapOvr>
+</p:sld>
+</file>
+
+<file path=ppt/slides/slide12.xml><?xml version="1.0" encoding="utf-8"?>
+<p:sld xmlns:a="http://schemas.openxmlformats.org/drawingml/2006/main" xmlns:r="http://schemas.openxmlformats.org/officeDocument/2006/relationships" xmlns:p="http://schemas.openxmlformats.org/presentationml/2006/main">
+  <p:cSld>
+    <p:spTree>
+      <p:nvGrpSpPr>
+        <p:cNvPr id="1" name=""/>
+        <p:cNvGrpSpPr/>
+        <p:nvPr/>
+      </p:nvGrpSpPr>
+      <p:grpSpPr>
+        <a:xfrm>
+          <a:off x="0" y="0"/>
+          <a:ext cx="0" cy="0"/>
+          <a:chOff x="0" y="0"/>
+          <a:chExt cx="0" cy="0"/>
+        </a:xfrm>
+      </p:grpSpPr>
+      <p:sp>
+        <p:nvSpPr>
+          <p:cNvPr id="2" name="Title 1"/>
+          <p:cNvSpPr>
+            <a:spLocks noGrp="1"/>
+          </p:cNvSpPr>
+          <p:nvPr>
+            <p:ph type="title"/>
+          </p:nvPr>
+        </p:nvSpPr>
+        <p:spPr/>
+        <p:txBody>
+          <a:bodyPr/>
+          <a:lstStyle/>
+          <a:p>
+            <a:r>
+              <a:rPr lang="en-US" dirty="0" smtClean="0"/>
+              <a:t>Scalable Framework</a:t>
+            </a:r>
+            <a:endParaRPr lang="en-US" dirty="0"/>
+          </a:p>
+        </p:txBody>
+      </p:sp>
+      <p:sp>
+        <p:nvSpPr>
+          <p:cNvPr id="3" name="Content Placeholder 2"/>
+          <p:cNvSpPr>
+            <a:spLocks noGrp="1"/>
+          </p:cNvSpPr>
+          <p:nvPr>
+            <p:ph idx="1"/>
+          </p:nvPr>
+        </p:nvSpPr>
+        <p:spPr>
+          <a:xfrm>
+            <a:off x="1727200" y="1581151"/>
+            <a:ext cx="9753600" cy="4114800"/>
+          </a:xfrm>
+        </p:spPr>
+        <p:txBody>
+          <a:bodyPr/>
+          <a:lstStyle/>
+          <a:p>
+            <a:r>
+              <a:rPr lang="en-US" dirty="0" smtClean="0"/>
+              <a:t>Separation of concerns</a:t>
+            </a:r>
+          </a:p>
+          <a:p>
+            <a:r>
+              <a:rPr lang="en-US" dirty="0" smtClean="0"/>
+              <a:t>Lazy load resources</a:t>
+            </a:r>
+          </a:p>
+          <a:p>
+            <a:r>
+              <a:rPr lang="en-US" dirty="0" smtClean="0"/>
+              <a:t>Based on Boilerplate.js</a:t>
+            </a:r>
+          </a:p>
+          <a:p>
+            <a:pPr lvl="1"/>
+            <a:r>
+              <a:rPr lang="en-US" dirty="0" smtClean="0"/>
+              <a:t>Thin</a:t>
+            </a:r>
+          </a:p>
+          <a:p>
+            <a:pPr lvl="1"/>
+            <a:r>
+              <a:rPr lang="en-US" dirty="0" smtClean="0"/>
+              <a:t>Full control</a:t>
+            </a:r>
+          </a:p>
+          <a:p>
+            <a:pPr lvl="1"/>
+            <a:r>
+              <a:rPr lang="en-US" dirty="0" smtClean="0"/>
+              <a:t>Configuration based</a:t>
+            </a:r>
+          </a:p>
+          <a:p>
+            <a:pPr lvl="1"/>
+            <a:r>
+              <a:rPr lang="en-US" dirty="0" smtClean="0"/>
+              <a:t>Takes over routing</a:t>
+            </a:r>
+          </a:p>
+        </p:txBody>
+      </p:sp>
+      <p:pic>
+        <p:nvPicPr>
+          <p:cNvPr id="4" name="Picture 3"/>
+          <p:cNvPicPr>
+            <a:picLocks noChangeAspect="1"/>
+          </p:cNvPicPr>
+          <p:nvPr/>
+        </p:nvPicPr>
+        <p:blipFill rotWithShape="1">
+          <a:blip r:embed="rId3"/>
+          <a:srcRect l="15544" t="12070" r="4296" b="16997"/>
+          <a:stretch/>
+        </p:blipFill>
+        <p:spPr>
+          <a:xfrm>
+            <a:off x="5834129" y="1001333"/>
+            <a:ext cx="4584880" cy="5687918"/>
+          </a:xfrm>
+          <a:prstGeom prst="rect">
+            <a:avLst/>
+          </a:prstGeom>
+        </p:spPr>
+      </p:pic>
+    </p:spTree>
+    <p:extLst>
+      <p:ext uri="{BB962C8B-B14F-4D97-AF65-F5344CB8AC3E}">
+        <p14:creationId xmlns:p14="http://schemas.microsoft.com/office/powerpoint/2010/main" val="2481330942"/>
+      </p:ext>
+    </p:extLst>
+  </p:cSld>
+  <p:clrMapOvr>
+    <a:masterClrMapping/>
+  </p:clrMapOvr>
+  <p:timing>
+    <p:tnLst>
+      <p:par>
+        <p:cTn id="1" dur="indefinite" restart="never" nodeType="tmRoot"/>
+      </p:par>
+    </p:tnLst>
+  </p:timing>
+</p:sld>
+</file>
+
+<file path=ppt/slides/slide13.xml><?xml version="1.0" encoding="utf-8"?>
+<p:sld xmlns:a="http://schemas.openxmlformats.org/drawingml/2006/main" xmlns:r="http://schemas.openxmlformats.org/officeDocument/2006/relationships" xmlns:p="http://schemas.openxmlformats.org/presentationml/2006/main">
+  <p:cSld>
+    <p:spTree>
+      <p:nvGrpSpPr>
+        <p:cNvPr id="1" name=""/>
+        <p:cNvGrpSpPr/>
+        <p:nvPr/>
+      </p:nvGrpSpPr>
+      <p:grpSpPr>
+        <a:xfrm>
+          <a:off x="0" y="0"/>
+          <a:ext cx="0" cy="0"/>
+          <a:chOff x="0" y="0"/>
+          <a:chExt cx="0" cy="0"/>
+        </a:xfrm>
+      </p:grpSpPr>
+      <p:sp>
+        <p:nvSpPr>
+          <p:cNvPr id="2" name="Title 1"/>
+          <p:cNvSpPr>
+            <a:spLocks noGrp="1"/>
+          </p:cNvSpPr>
+          <p:nvPr>
+            <p:ph type="title"/>
+          </p:nvPr>
+        </p:nvSpPr>
         <p:spPr/>
         <p:txBody>
           <a:bodyPr/>
@@ -6423,7 +6740,7 @@
 </p:sld>
 </file>
 
-<file path=ppt/slides/slide11.xml><?xml version="1.0" encoding="utf-8"?>
+<file path=ppt/slides/slide14.xml><?xml version="1.0" encoding="utf-8"?>
 <p:sld xmlns:a="http://schemas.openxmlformats.org/drawingml/2006/main" xmlns:r="http://schemas.openxmlformats.org/officeDocument/2006/relationships" xmlns:p="http://schemas.openxmlformats.org/presentationml/2006/main">
   <p:cSld>
     <p:spTree>
@@ -6483,7 +6800,7 @@
 </p:sld>
 </file>
 
-<file path=ppt/slides/slide12.xml><?xml version="1.0" encoding="utf-8"?>
+<file path=ppt/slides/slide15.xml><?xml version="1.0" encoding="utf-8"?>
 <p:sld xmlns:a="http://schemas.openxmlformats.org/drawingml/2006/main" xmlns:r="http://schemas.openxmlformats.org/officeDocument/2006/relationships" xmlns:p="http://schemas.openxmlformats.org/presentationml/2006/main">
   <p:cSld>
     <p:spTree>
@@ -6594,7 +6911,7 @@
 </p:sld>
 </file>
 
-<file path=ppt/slides/slide13.xml><?xml version="1.0" encoding="utf-8"?>
+<file path=ppt/slides/slide16.xml><?xml version="1.0" encoding="utf-8"?>
 <p:sld xmlns:a="http://schemas.openxmlformats.org/drawingml/2006/main" xmlns:r="http://schemas.openxmlformats.org/officeDocument/2006/relationships" xmlns:p="http://schemas.openxmlformats.org/presentationml/2006/main">
   <p:cSld>
     <p:spTree>
@@ -6718,7 +7035,7 @@
 </p:sld>
 </file>
 
-<file path=ppt/slides/slide14.xml><?xml version="1.0" encoding="utf-8"?>
+<file path=ppt/slides/slide17.xml><?xml version="1.0" encoding="utf-8"?>
 <p:sld xmlns:a="http://schemas.openxmlformats.org/drawingml/2006/main" xmlns:r="http://schemas.openxmlformats.org/officeDocument/2006/relationships" xmlns:p="http://schemas.openxmlformats.org/presentationml/2006/main">
   <p:cSld>
     <p:spTree>
@@ -6796,7 +7113,7 @@
 </p:sld>
 </file>
 
-<file path=ppt/slides/slide15.xml><?xml version="1.0" encoding="utf-8"?>
+<file path=ppt/slides/slide18.xml><?xml version="1.0" encoding="utf-8"?>
 <p:sld xmlns:a="http://schemas.openxmlformats.org/drawingml/2006/main" xmlns:r="http://schemas.openxmlformats.org/officeDocument/2006/relationships" xmlns:p="http://schemas.openxmlformats.org/presentationml/2006/main">
   <p:cSld>
     <p:spTree>
@@ -6861,7 +7178,7 @@
 </p:sld>
 </file>
 
-<file path=ppt/slides/slide16.xml><?xml version="1.0" encoding="utf-8"?>
+<file path=ppt/slides/slide19.xml><?xml version="1.0" encoding="utf-8"?>
 <p:sld xmlns:a="http://schemas.openxmlformats.org/drawingml/2006/main" xmlns:r="http://schemas.openxmlformats.org/officeDocument/2006/relationships" xmlns:p="http://schemas.openxmlformats.org/presentationml/2006/main">
   <p:cSld>
     <p:spTree>
@@ -6946,262 +7263,6 @@
     <p:extLst>
       <p:ext uri="{BB962C8B-B14F-4D97-AF65-F5344CB8AC3E}">
         <p14:creationId xmlns:p14="http://schemas.microsoft.com/office/powerpoint/2010/main" val="3839694761"/>
-      </p:ext>
-    </p:extLst>
-  </p:cSld>
-  <p:clrMapOvr>
-    <a:masterClrMapping/>
-  </p:clrMapOvr>
-  <p:timing>
-    <p:tnLst>
-      <p:par>
-        <p:cTn id="1" dur="indefinite" restart="never" nodeType="tmRoot"/>
-      </p:par>
-    </p:tnLst>
-  </p:timing>
-</p:sld>
-</file>
-
-<file path=ppt/slides/slide17.xml><?xml version="1.0" encoding="utf-8"?>
-<p:sld xmlns:a="http://schemas.openxmlformats.org/drawingml/2006/main" xmlns:r="http://schemas.openxmlformats.org/officeDocument/2006/relationships" xmlns:p="http://schemas.openxmlformats.org/presentationml/2006/main">
-  <p:cSld>
-    <p:spTree>
-      <p:nvGrpSpPr>
-        <p:cNvPr id="1" name=""/>
-        <p:cNvGrpSpPr/>
-        <p:nvPr/>
-      </p:nvGrpSpPr>
-      <p:grpSpPr>
-        <a:xfrm>
-          <a:off x="0" y="0"/>
-          <a:ext cx="0" cy="0"/>
-          <a:chOff x="0" y="0"/>
-          <a:chExt cx="0" cy="0"/>
-        </a:xfrm>
-      </p:grpSpPr>
-      <p:sp>
-        <p:nvSpPr>
-          <p:cNvPr id="2" name="Title 1"/>
-          <p:cNvSpPr>
-            <a:spLocks noGrp="1"/>
-          </p:cNvSpPr>
-          <p:nvPr>
-            <p:ph type="title"/>
-          </p:nvPr>
-        </p:nvSpPr>
-        <p:spPr/>
-        <p:txBody>
-          <a:bodyPr/>
-          <a:lstStyle/>
-          <a:p>
-            <a:r>
-              <a:rPr lang="en-US" dirty="0" smtClean="0"/>
-              <a:t>Data In a Breeze</a:t>
-            </a:r>
-            <a:endParaRPr lang="en-US" dirty="0"/>
-          </a:p>
-        </p:txBody>
-      </p:sp>
-      <p:sp>
-        <p:nvSpPr>
-          <p:cNvPr id="3" name="Content Placeholder 2"/>
-          <p:cNvSpPr>
-            <a:spLocks noGrp="1"/>
-          </p:cNvSpPr>
-          <p:nvPr>
-            <p:ph idx="1"/>
-          </p:nvPr>
-        </p:nvSpPr>
-        <p:spPr/>
-        <p:txBody>
-          <a:bodyPr/>
-          <a:lstStyle/>
-          <a:p>
-            <a:pPr marL="0" indent="0">
-              <a:buNone/>
-            </a:pPr>
-            <a:r>
-              <a:rPr lang="en-US" sz="6600" dirty="0" smtClean="0"/>
-              <a:t>“</a:t>
-            </a:r>
-            <a:r>
-              <a:rPr lang="en-US" sz="6600" b="1" dirty="0"/>
-              <a:t>1/4 the code, about 1/4 the time, and </a:t>
-            </a:r>
-            <a:r>
-              <a:rPr lang="en-US" sz="6600" b="1" dirty="0" smtClean="0"/>
-              <a:t>more </a:t>
-            </a:r>
-            <a:r>
-              <a:rPr lang="en-US" sz="6600" b="1" dirty="0"/>
-              <a:t>value. Does that interest you</a:t>
-            </a:r>
-            <a:r>
-              <a:rPr lang="en-US" sz="6600" b="1" dirty="0" smtClean="0"/>
-              <a:t>?” </a:t>
-            </a:r>
-          </a:p>
-          <a:p>
-            <a:pPr marL="0" indent="0">
-              <a:buNone/>
-            </a:pPr>
-            <a:r>
-              <a:rPr lang="en-US" b="1" dirty="0" smtClean="0"/>
-              <a:t>–John Papa</a:t>
-            </a:r>
-            <a:endParaRPr lang="en-US" sz="6600" dirty="0"/>
-          </a:p>
-        </p:txBody>
-      </p:sp>
-    </p:spTree>
-    <p:extLst>
-      <p:ext uri="{BB962C8B-B14F-4D97-AF65-F5344CB8AC3E}">
-        <p14:creationId xmlns:p14="http://schemas.microsoft.com/office/powerpoint/2010/main" val="809561950"/>
-      </p:ext>
-    </p:extLst>
-  </p:cSld>
-  <p:clrMapOvr>
-    <a:masterClrMapping/>
-  </p:clrMapOvr>
-  <p:timing>
-    <p:tnLst>
-      <p:par>
-        <p:cTn id="1" dur="indefinite" restart="never" nodeType="tmRoot"/>
-      </p:par>
-    </p:tnLst>
-  </p:timing>
-</p:sld>
-</file>
-
-<file path=ppt/slides/slide18.xml><?xml version="1.0" encoding="utf-8"?>
-<p:sld xmlns:a="http://schemas.openxmlformats.org/drawingml/2006/main" xmlns:r="http://schemas.openxmlformats.org/officeDocument/2006/relationships" xmlns:p="http://schemas.openxmlformats.org/presentationml/2006/main">
-  <p:cSld>
-    <p:spTree>
-      <p:nvGrpSpPr>
-        <p:cNvPr id="1" name=""/>
-        <p:cNvGrpSpPr/>
-        <p:nvPr/>
-      </p:nvGrpSpPr>
-      <p:grpSpPr>
-        <a:xfrm>
-          <a:off x="0" y="0"/>
-          <a:ext cx="0" cy="0"/>
-          <a:chOff x="0" y="0"/>
-          <a:chExt cx="0" cy="0"/>
-        </a:xfrm>
-      </p:grpSpPr>
-      <p:sp>
-        <p:nvSpPr>
-          <p:cNvPr id="2" name="Title 1"/>
-          <p:cNvSpPr>
-            <a:spLocks noGrp="1"/>
-          </p:cNvSpPr>
-          <p:nvPr>
-            <p:ph type="title"/>
-          </p:nvPr>
-        </p:nvSpPr>
-        <p:spPr/>
-        <p:txBody>
-          <a:bodyPr/>
-          <a:lstStyle/>
-          <a:p>
-            <a:r>
-              <a:rPr lang="en-US" dirty="0" smtClean="0"/>
-              <a:t>What about Breeze?</a:t>
-            </a:r>
-            <a:endParaRPr lang="en-US" dirty="0"/>
-          </a:p>
-        </p:txBody>
-      </p:sp>
-      <p:pic>
-        <p:nvPicPr>
-          <p:cNvPr id="25" name="Picture 24"/>
-          <p:cNvPicPr>
-            <a:picLocks noChangeAspect="1"/>
-          </p:cNvPicPr>
-          <p:nvPr/>
-        </p:nvPicPr>
-        <p:blipFill>
-          <a:blip r:embed="rId3"/>
-          <a:stretch>
-            <a:fillRect/>
-          </a:stretch>
-        </p:blipFill>
-        <p:spPr>
-          <a:xfrm>
-            <a:off x="308482" y="1417638"/>
-            <a:ext cx="11676635" cy="3916362"/>
-          </a:xfrm>
-          <a:prstGeom prst="rect">
-            <a:avLst/>
-          </a:prstGeom>
-        </p:spPr>
-      </p:pic>
-    </p:spTree>
-    <p:extLst>
-      <p:ext uri="{BB962C8B-B14F-4D97-AF65-F5344CB8AC3E}">
-        <p14:creationId xmlns:p14="http://schemas.microsoft.com/office/powerpoint/2010/main" val="614696081"/>
-      </p:ext>
-    </p:extLst>
-  </p:cSld>
-  <p:clrMapOvr>
-    <a:masterClrMapping/>
-  </p:clrMapOvr>
-  <p:timing>
-    <p:tnLst>
-      <p:par>
-        <p:cTn id="1" dur="indefinite" restart="never" nodeType="tmRoot"/>
-      </p:par>
-    </p:tnLst>
-  </p:timing>
-</p:sld>
-</file>
-
-<file path=ppt/slides/slide19.xml><?xml version="1.0" encoding="utf-8"?>
-<p:sld xmlns:a="http://schemas.openxmlformats.org/drawingml/2006/main" xmlns:r="http://schemas.openxmlformats.org/officeDocument/2006/relationships" xmlns:p="http://schemas.openxmlformats.org/presentationml/2006/main">
-  <p:cSld>
-    <p:spTree>
-      <p:nvGrpSpPr>
-        <p:cNvPr id="1" name=""/>
-        <p:cNvGrpSpPr/>
-        <p:nvPr/>
-      </p:nvGrpSpPr>
-      <p:grpSpPr>
-        <a:xfrm>
-          <a:off x="0" y="0"/>
-          <a:ext cx="0" cy="0"/>
-          <a:chOff x="0" y="0"/>
-          <a:chExt cx="0" cy="0"/>
-        </a:xfrm>
-      </p:grpSpPr>
-      <p:pic>
-        <p:nvPicPr>
-          <p:cNvPr id="4" name="Picture 3"/>
-          <p:cNvPicPr>
-            <a:picLocks noChangeAspect="1"/>
-          </p:cNvPicPr>
-          <p:nvPr/>
-        </p:nvPicPr>
-        <p:blipFill>
-          <a:blip r:embed="rId2"/>
-          <a:stretch>
-            <a:fillRect/>
-          </a:stretch>
-        </p:blipFill>
-        <p:spPr>
-          <a:xfrm>
-            <a:off x="195262" y="661987"/>
-            <a:ext cx="11848277" cy="4595813"/>
-          </a:xfrm>
-          <a:prstGeom prst="rect">
-            <a:avLst/>
-          </a:prstGeom>
-        </p:spPr>
-      </p:pic>
-    </p:spTree>
-    <p:extLst>
-      <p:ext uri="{BB962C8B-B14F-4D97-AF65-F5344CB8AC3E}">
-        <p14:creationId xmlns:p14="http://schemas.microsoft.com/office/powerpoint/2010/main" val="2067061357"/>
       </p:ext>
     </p:extLst>
   </p:cSld>
@@ -7319,34 +7380,84 @@
           <a:chExt cx="0" cy="0"/>
         </a:xfrm>
       </p:grpSpPr>
-      <p:pic>
-        <p:nvPicPr>
-          <p:cNvPr id="4" name="Picture 3"/>
-          <p:cNvPicPr>
-            <a:picLocks noChangeAspect="1"/>
-          </p:cNvPicPr>
-          <p:nvPr/>
-        </p:nvPicPr>
-        <p:blipFill>
-          <a:blip r:embed="rId2"/>
-          <a:stretch>
-            <a:fillRect/>
-          </a:stretch>
-        </p:blipFill>
-        <p:spPr>
-          <a:xfrm>
-            <a:off x="133350" y="1781174"/>
-            <a:ext cx="11941818" cy="2657475"/>
-          </a:xfrm>
-          <a:prstGeom prst="rect">
-            <a:avLst/>
-          </a:prstGeom>
-        </p:spPr>
-      </p:pic>
+      <p:sp>
+        <p:nvSpPr>
+          <p:cNvPr id="2" name="Title 1"/>
+          <p:cNvSpPr>
+            <a:spLocks noGrp="1"/>
+          </p:cNvSpPr>
+          <p:nvPr>
+            <p:ph type="title"/>
+          </p:nvPr>
+        </p:nvSpPr>
+        <p:spPr/>
+        <p:txBody>
+          <a:bodyPr/>
+          <a:lstStyle/>
+          <a:p>
+            <a:r>
+              <a:rPr lang="en-US" dirty="0" smtClean="0"/>
+              <a:t>Data In a Breeze</a:t>
+            </a:r>
+            <a:endParaRPr lang="en-US" dirty="0"/>
+          </a:p>
+        </p:txBody>
+      </p:sp>
+      <p:sp>
+        <p:nvSpPr>
+          <p:cNvPr id="3" name="Content Placeholder 2"/>
+          <p:cNvSpPr>
+            <a:spLocks noGrp="1"/>
+          </p:cNvSpPr>
+          <p:nvPr>
+            <p:ph idx="1"/>
+          </p:nvPr>
+        </p:nvSpPr>
+        <p:spPr/>
+        <p:txBody>
+          <a:bodyPr/>
+          <a:lstStyle/>
+          <a:p>
+            <a:pPr marL="0" indent="0">
+              <a:buNone/>
+            </a:pPr>
+            <a:r>
+              <a:rPr lang="en-US" sz="6600" dirty="0" smtClean="0"/>
+              <a:t>“</a:t>
+            </a:r>
+            <a:r>
+              <a:rPr lang="en-US" sz="6600" b="1" dirty="0"/>
+              <a:t>1/4 the code, about 1/4 the time, and </a:t>
+            </a:r>
+            <a:r>
+              <a:rPr lang="en-US" sz="6600" b="1" dirty="0" smtClean="0"/>
+              <a:t>more </a:t>
+            </a:r>
+            <a:r>
+              <a:rPr lang="en-US" sz="6600" b="1" dirty="0"/>
+              <a:t>value. Does that interest you</a:t>
+            </a:r>
+            <a:r>
+              <a:rPr lang="en-US" sz="6600" b="1" dirty="0" smtClean="0"/>
+              <a:t>?” </a:t>
+            </a:r>
+          </a:p>
+          <a:p>
+            <a:pPr marL="0" indent="0">
+              <a:buNone/>
+            </a:pPr>
+            <a:r>
+              <a:rPr lang="en-US" b="1" dirty="0" smtClean="0"/>
+              <a:t>–John Papa</a:t>
+            </a:r>
+            <a:endParaRPr lang="en-US" sz="6600" dirty="0"/>
+          </a:p>
+        </p:txBody>
+      </p:sp>
     </p:spTree>
     <p:extLst>
       <p:ext uri="{BB962C8B-B14F-4D97-AF65-F5344CB8AC3E}">
-        <p14:creationId xmlns:p14="http://schemas.microsoft.com/office/powerpoint/2010/main" val="4189272406"/>
+        <p14:creationId xmlns:p14="http://schemas.microsoft.com/office/powerpoint/2010/main" val="809561950"/>
       </p:ext>
     </p:extLst>
   </p:cSld>
@@ -7397,6 +7508,212 @@
           <a:p>
             <a:r>
               <a:rPr lang="en-US" dirty="0" smtClean="0"/>
+              <a:t>What about Breeze?</a:t>
+            </a:r>
+            <a:endParaRPr lang="en-US" dirty="0"/>
+          </a:p>
+        </p:txBody>
+      </p:sp>
+      <p:pic>
+        <p:nvPicPr>
+          <p:cNvPr id="25" name="Picture 24"/>
+          <p:cNvPicPr>
+            <a:picLocks noChangeAspect="1"/>
+          </p:cNvPicPr>
+          <p:nvPr/>
+        </p:nvPicPr>
+        <p:blipFill>
+          <a:blip r:embed="rId3"/>
+          <a:stretch>
+            <a:fillRect/>
+          </a:stretch>
+        </p:blipFill>
+        <p:spPr>
+          <a:xfrm>
+            <a:off x="308482" y="1417638"/>
+            <a:ext cx="11676635" cy="3916362"/>
+          </a:xfrm>
+          <a:prstGeom prst="rect">
+            <a:avLst/>
+          </a:prstGeom>
+        </p:spPr>
+      </p:pic>
+    </p:spTree>
+    <p:extLst>
+      <p:ext uri="{BB962C8B-B14F-4D97-AF65-F5344CB8AC3E}">
+        <p14:creationId xmlns:p14="http://schemas.microsoft.com/office/powerpoint/2010/main" val="614696081"/>
+      </p:ext>
+    </p:extLst>
+  </p:cSld>
+  <p:clrMapOvr>
+    <a:masterClrMapping/>
+  </p:clrMapOvr>
+  <p:timing>
+    <p:tnLst>
+      <p:par>
+        <p:cTn id="1" dur="indefinite" restart="never" nodeType="tmRoot"/>
+      </p:par>
+    </p:tnLst>
+  </p:timing>
+</p:sld>
+</file>
+
+<file path=ppt/slides/slide22.xml><?xml version="1.0" encoding="utf-8"?>
+<p:sld xmlns:a="http://schemas.openxmlformats.org/drawingml/2006/main" xmlns:r="http://schemas.openxmlformats.org/officeDocument/2006/relationships" xmlns:p="http://schemas.openxmlformats.org/presentationml/2006/main">
+  <p:cSld>
+    <p:spTree>
+      <p:nvGrpSpPr>
+        <p:cNvPr id="1" name=""/>
+        <p:cNvGrpSpPr/>
+        <p:nvPr/>
+      </p:nvGrpSpPr>
+      <p:grpSpPr>
+        <a:xfrm>
+          <a:off x="0" y="0"/>
+          <a:ext cx="0" cy="0"/>
+          <a:chOff x="0" y="0"/>
+          <a:chExt cx="0" cy="0"/>
+        </a:xfrm>
+      </p:grpSpPr>
+      <p:pic>
+        <p:nvPicPr>
+          <p:cNvPr id="4" name="Picture 3"/>
+          <p:cNvPicPr>
+            <a:picLocks noChangeAspect="1"/>
+          </p:cNvPicPr>
+          <p:nvPr/>
+        </p:nvPicPr>
+        <p:blipFill>
+          <a:blip r:embed="rId2"/>
+          <a:stretch>
+            <a:fillRect/>
+          </a:stretch>
+        </p:blipFill>
+        <p:spPr>
+          <a:xfrm>
+            <a:off x="195262" y="661987"/>
+            <a:ext cx="11848277" cy="4595813"/>
+          </a:xfrm>
+          <a:prstGeom prst="rect">
+            <a:avLst/>
+          </a:prstGeom>
+        </p:spPr>
+      </p:pic>
+    </p:spTree>
+    <p:extLst>
+      <p:ext uri="{BB962C8B-B14F-4D97-AF65-F5344CB8AC3E}">
+        <p14:creationId xmlns:p14="http://schemas.microsoft.com/office/powerpoint/2010/main" val="2067061357"/>
+      </p:ext>
+    </p:extLst>
+  </p:cSld>
+  <p:clrMapOvr>
+    <a:masterClrMapping/>
+  </p:clrMapOvr>
+  <p:timing>
+    <p:tnLst>
+      <p:par>
+        <p:cTn id="1" dur="indefinite" restart="never" nodeType="tmRoot"/>
+      </p:par>
+    </p:tnLst>
+  </p:timing>
+</p:sld>
+</file>
+
+<file path=ppt/slides/slide23.xml><?xml version="1.0" encoding="utf-8"?>
+<p:sld xmlns:a="http://schemas.openxmlformats.org/drawingml/2006/main" xmlns:r="http://schemas.openxmlformats.org/officeDocument/2006/relationships" xmlns:p="http://schemas.openxmlformats.org/presentationml/2006/main">
+  <p:cSld>
+    <p:spTree>
+      <p:nvGrpSpPr>
+        <p:cNvPr id="1" name=""/>
+        <p:cNvGrpSpPr/>
+        <p:nvPr/>
+      </p:nvGrpSpPr>
+      <p:grpSpPr>
+        <a:xfrm>
+          <a:off x="0" y="0"/>
+          <a:ext cx="0" cy="0"/>
+          <a:chOff x="0" y="0"/>
+          <a:chExt cx="0" cy="0"/>
+        </a:xfrm>
+      </p:grpSpPr>
+      <p:pic>
+        <p:nvPicPr>
+          <p:cNvPr id="4" name="Picture 3"/>
+          <p:cNvPicPr>
+            <a:picLocks noChangeAspect="1"/>
+          </p:cNvPicPr>
+          <p:nvPr/>
+        </p:nvPicPr>
+        <p:blipFill>
+          <a:blip r:embed="rId2"/>
+          <a:stretch>
+            <a:fillRect/>
+          </a:stretch>
+        </p:blipFill>
+        <p:spPr>
+          <a:xfrm>
+            <a:off x="133350" y="1781174"/>
+            <a:ext cx="11941818" cy="2657475"/>
+          </a:xfrm>
+          <a:prstGeom prst="rect">
+            <a:avLst/>
+          </a:prstGeom>
+        </p:spPr>
+      </p:pic>
+    </p:spTree>
+    <p:extLst>
+      <p:ext uri="{BB962C8B-B14F-4D97-AF65-F5344CB8AC3E}">
+        <p14:creationId xmlns:p14="http://schemas.microsoft.com/office/powerpoint/2010/main" val="4189272406"/>
+      </p:ext>
+    </p:extLst>
+  </p:cSld>
+  <p:clrMapOvr>
+    <a:masterClrMapping/>
+  </p:clrMapOvr>
+  <p:timing>
+    <p:tnLst>
+      <p:par>
+        <p:cTn id="1" dur="indefinite" restart="never" nodeType="tmRoot"/>
+      </p:par>
+    </p:tnLst>
+  </p:timing>
+</p:sld>
+</file>
+
+<file path=ppt/slides/slide24.xml><?xml version="1.0" encoding="utf-8"?>
+<p:sld xmlns:a="http://schemas.openxmlformats.org/drawingml/2006/main" xmlns:r="http://schemas.openxmlformats.org/officeDocument/2006/relationships" xmlns:p="http://schemas.openxmlformats.org/presentationml/2006/main">
+  <p:cSld>
+    <p:spTree>
+      <p:nvGrpSpPr>
+        <p:cNvPr id="1" name=""/>
+        <p:cNvGrpSpPr/>
+        <p:nvPr/>
+      </p:nvGrpSpPr>
+      <p:grpSpPr>
+        <a:xfrm>
+          <a:off x="0" y="0"/>
+          <a:ext cx="0" cy="0"/>
+          <a:chOff x="0" y="0"/>
+          <a:chExt cx="0" cy="0"/>
+        </a:xfrm>
+      </p:grpSpPr>
+      <p:sp>
+        <p:nvSpPr>
+          <p:cNvPr id="2" name="Title 1"/>
+          <p:cNvSpPr>
+            <a:spLocks noGrp="1"/>
+          </p:cNvSpPr>
+          <p:nvPr>
+            <p:ph type="title"/>
+          </p:nvPr>
+        </p:nvSpPr>
+        <p:spPr/>
+        <p:txBody>
+          <a:bodyPr/>
+          <a:lstStyle/>
+          <a:p>
+            <a:r>
+              <a:rPr lang="en-US" dirty="0" smtClean="0"/>
               <a:t>Security</a:t>
             </a:r>
             <a:endParaRPr lang="en-US" dirty="0"/>
@@ -7488,7 +7805,7 @@
 </p:sld>
 </file>
 
-<file path=ppt/slides/slide22.xml><?xml version="1.0" encoding="utf-8"?>
+<file path=ppt/slides/slide25.xml><?xml version="1.0" encoding="utf-8"?>
 <p:sld xmlns:a="http://schemas.openxmlformats.org/drawingml/2006/main" xmlns:r="http://schemas.openxmlformats.org/officeDocument/2006/relationships" xmlns:p="http://schemas.openxmlformats.org/presentationml/2006/main">
   <p:cSld>
     <p:spTree>
@@ -7643,7 +7960,89 @@
 </p:sld>
 </file>
 
-<file path=ppt/slides/slide23.xml><?xml version="1.0" encoding="utf-8"?>
+<file path=ppt/slides/slide26.xml><?xml version="1.0" encoding="utf-8"?>
+<p:sld xmlns:a="http://schemas.openxmlformats.org/drawingml/2006/main" xmlns:r="http://schemas.openxmlformats.org/officeDocument/2006/relationships" xmlns:p="http://schemas.openxmlformats.org/presentationml/2006/main">
+  <p:cSld>
+    <p:spTree>
+      <p:nvGrpSpPr>
+        <p:cNvPr id="1" name=""/>
+        <p:cNvGrpSpPr/>
+        <p:nvPr/>
+      </p:nvGrpSpPr>
+      <p:grpSpPr>
+        <a:xfrm>
+          <a:off x="0" y="0"/>
+          <a:ext cx="0" cy="0"/>
+          <a:chOff x="0" y="0"/>
+          <a:chExt cx="0" cy="0"/>
+        </a:xfrm>
+      </p:grpSpPr>
+      <p:sp>
+        <p:nvSpPr>
+          <p:cNvPr id="2" name="Title 1"/>
+          <p:cNvSpPr>
+            <a:spLocks noGrp="1"/>
+          </p:cNvSpPr>
+          <p:nvPr>
+            <p:ph type="title"/>
+          </p:nvPr>
+        </p:nvSpPr>
+        <p:spPr>
+          <a:xfrm>
+            <a:off x="812800" y="274638"/>
+            <a:ext cx="10668000" cy="742793"/>
+          </a:xfrm>
+        </p:spPr>
+        <p:txBody>
+          <a:bodyPr/>
+          <a:lstStyle/>
+          <a:p>
+            <a:r>
+              <a:rPr lang="en-US" dirty="0" smtClean="0"/>
+              <a:t>Error Logging</a:t>
+            </a:r>
+            <a:endParaRPr lang="en-US" dirty="0"/>
+          </a:p>
+        </p:txBody>
+      </p:sp>
+      <p:pic>
+        <p:nvPicPr>
+          <p:cNvPr id="4" name="Picture 3"/>
+          <p:cNvPicPr>
+            <a:picLocks noChangeAspect="1"/>
+          </p:cNvPicPr>
+          <p:nvPr/>
+        </p:nvPicPr>
+        <p:blipFill>
+          <a:blip r:embed="rId2"/>
+          <a:stretch>
+            <a:fillRect/>
+          </a:stretch>
+        </p:blipFill>
+        <p:spPr>
+          <a:xfrm>
+            <a:off x="172523" y="1564245"/>
+            <a:ext cx="11740435" cy="3109339"/>
+          </a:xfrm>
+          <a:prstGeom prst="rect">
+            <a:avLst/>
+          </a:prstGeom>
+        </p:spPr>
+      </p:pic>
+    </p:spTree>
+    <p:extLst>
+      <p:ext uri="{BB962C8B-B14F-4D97-AF65-F5344CB8AC3E}">
+        <p14:creationId xmlns:p14="http://schemas.microsoft.com/office/powerpoint/2010/main" val="4237344934"/>
+      </p:ext>
+    </p:extLst>
+  </p:cSld>
+  <p:clrMapOvr>
+    <a:masterClrMapping/>
+  </p:clrMapOvr>
+</p:sld>
+</file>
+
+<file path=ppt/slides/slide27.xml><?xml version="1.0" encoding="utf-8"?>
 <p:sld xmlns:a="http://schemas.openxmlformats.org/drawingml/2006/main" xmlns:r="http://schemas.openxmlformats.org/officeDocument/2006/relationships" xmlns:p="http://schemas.openxmlformats.org/presentationml/2006/main">
   <p:cSld>
     <p:spTree>
@@ -7783,7 +8182,7 @@
 </p:sld>
 </file>
 
-<file path=ppt/slides/slide24.xml><?xml version="1.0" encoding="utf-8"?>
+<file path=ppt/slides/slide28.xml><?xml version="1.0" encoding="utf-8"?>
 <p:sld xmlns:a="http://schemas.openxmlformats.org/drawingml/2006/main" xmlns:r="http://schemas.openxmlformats.org/officeDocument/2006/relationships" xmlns:p="http://schemas.openxmlformats.org/presentationml/2006/main">
   <p:cSld>
     <p:spTree>
@@ -8029,7 +8428,7 @@
 </p:sld>
 </file>
 
-<file path=ppt/slides/slide25.xml><?xml version="1.0" encoding="utf-8"?>
+<file path=ppt/slides/slide29.xml><?xml version="1.0" encoding="utf-8"?>
 <p:sld xmlns:a="http://schemas.openxmlformats.org/drawingml/2006/main" xmlns:r="http://schemas.openxmlformats.org/officeDocument/2006/relationships" xmlns:p="http://schemas.openxmlformats.org/presentationml/2006/main">
   <p:cSld>
     <p:spTree>
@@ -8607,7 +9006,7 @@
 </p:sld>
 </file>
 
-<file path=ppt/slides/slide26.xml><?xml version="1.0" encoding="utf-8"?>
+<file path=ppt/slides/slide3.xml><?xml version="1.0" encoding="utf-8"?>
 <p:sld xmlns:a="http://schemas.openxmlformats.org/drawingml/2006/main" xmlns:r="http://schemas.openxmlformats.org/officeDocument/2006/relationships" xmlns:p="http://schemas.openxmlformats.org/presentationml/2006/main">
   <p:cSld>
     <p:spTree>
@@ -8641,6 +9040,92 @@
           <a:p>
             <a:r>
               <a:rPr lang="en-US" dirty="0" smtClean="0"/>
+              <a:t>MVVM</a:t>
+            </a:r>
+            <a:endParaRPr lang="en-US" dirty="0"/>
+          </a:p>
+        </p:txBody>
+      </p:sp>
+      <p:pic>
+        <p:nvPicPr>
+          <p:cNvPr id="23" name="Content Placeholder 22"/>
+          <p:cNvPicPr>
+            <a:picLocks noGrp="1" noChangeAspect="1"/>
+          </p:cNvPicPr>
+          <p:nvPr>
+            <p:ph idx="1"/>
+          </p:nvPr>
+        </p:nvPicPr>
+        <p:blipFill>
+          <a:blip r:embed="rId3"/>
+          <a:stretch>
+            <a:fillRect/>
+          </a:stretch>
+        </p:blipFill>
+        <p:spPr>
+          <a:xfrm>
+            <a:off x="910897" y="1417638"/>
+            <a:ext cx="10569903" cy="3781342"/>
+          </a:xfrm>
+          <a:prstGeom prst="rect">
+            <a:avLst/>
+          </a:prstGeom>
+        </p:spPr>
+      </p:pic>
+    </p:spTree>
+    <p:extLst>
+      <p:ext uri="{BB962C8B-B14F-4D97-AF65-F5344CB8AC3E}">
+        <p14:creationId xmlns:p14="http://schemas.microsoft.com/office/powerpoint/2010/main" val="2048388921"/>
+      </p:ext>
+    </p:extLst>
+  </p:cSld>
+  <p:clrMapOvr>
+    <a:masterClrMapping/>
+  </p:clrMapOvr>
+  <p:timing>
+    <p:tnLst>
+      <p:par>
+        <p:cTn id="1" dur="indefinite" restart="never" nodeType="tmRoot"/>
+      </p:par>
+    </p:tnLst>
+  </p:timing>
+</p:sld>
+</file>
+
+<file path=ppt/slides/slide30.xml><?xml version="1.0" encoding="utf-8"?>
+<p:sld xmlns:a="http://schemas.openxmlformats.org/drawingml/2006/main" xmlns:r="http://schemas.openxmlformats.org/officeDocument/2006/relationships" xmlns:p="http://schemas.openxmlformats.org/presentationml/2006/main">
+  <p:cSld>
+    <p:spTree>
+      <p:nvGrpSpPr>
+        <p:cNvPr id="1" name=""/>
+        <p:cNvGrpSpPr/>
+        <p:nvPr/>
+      </p:nvGrpSpPr>
+      <p:grpSpPr>
+        <a:xfrm>
+          <a:off x="0" y="0"/>
+          <a:ext cx="0" cy="0"/>
+          <a:chOff x="0" y="0"/>
+          <a:chExt cx="0" cy="0"/>
+        </a:xfrm>
+      </p:grpSpPr>
+      <p:sp>
+        <p:nvSpPr>
+          <p:cNvPr id="2" name="Title 1"/>
+          <p:cNvSpPr>
+            <a:spLocks noGrp="1"/>
+          </p:cNvSpPr>
+          <p:nvPr>
+            <p:ph type="title"/>
+          </p:nvPr>
+        </p:nvSpPr>
+        <p:spPr/>
+        <p:txBody>
+          <a:bodyPr/>
+          <a:lstStyle/>
+          <a:p>
+            <a:r>
+              <a:rPr lang="en-US" dirty="0" smtClean="0"/>
               <a:t>Get Lean</a:t>
             </a:r>
             <a:endParaRPr lang="en-US" dirty="0"/>
@@ -8686,7 +9171,6 @@
               <a:rPr lang="en-US" dirty="0" smtClean="0"/>
               <a:t>  </a:t>
             </a:r>
-            <a:endParaRPr lang="en-US" dirty="0" smtClean="0"/>
           </a:p>
           <a:p>
             <a:pPr marL="0" indent="0" algn="ctr">
@@ -8696,7 +9180,6 @@
               <a:rPr lang="en-US" dirty="0" smtClean="0"/>
               <a:t>or</a:t>
             </a:r>
-            <a:endParaRPr lang="en-US" dirty="0" smtClean="0"/>
           </a:p>
           <a:p>
             <a:pPr marL="0" indent="0" algn="ctr">
@@ -8706,7 +9189,6 @@
               <a:rPr lang="en-US" dirty="0" smtClean="0"/>
               <a:t>goo.gl/xAii7</a:t>
             </a:r>
-            <a:endParaRPr lang="en-US" dirty="0" smtClean="0"/>
           </a:p>
           <a:p>
             <a:pPr marL="0" indent="0" algn="ctr">
@@ -8952,7 +9434,7 @@
 </p:sld>
 </file>
 
-<file path=ppt/slides/slide27.xml><?xml version="1.0" encoding="utf-8"?>
+<file path=ppt/slides/slide31.xml><?xml version="1.0" encoding="utf-8"?>
 <p:sld xmlns:a="http://schemas.openxmlformats.org/drawingml/2006/main" xmlns:r="http://schemas.openxmlformats.org/officeDocument/2006/relationships" xmlns:p="http://schemas.openxmlformats.org/presentationml/2006/main">
   <p:cSld>
     <p:spTree>
@@ -8973,92 +9455,6 @@
     <p:extLst>
       <p:ext uri="{BB962C8B-B14F-4D97-AF65-F5344CB8AC3E}">
         <p14:creationId xmlns:p14="http://schemas.microsoft.com/office/powerpoint/2010/main" val="152841896"/>
-      </p:ext>
-    </p:extLst>
-  </p:cSld>
-  <p:clrMapOvr>
-    <a:masterClrMapping/>
-  </p:clrMapOvr>
-  <p:timing>
-    <p:tnLst>
-      <p:par>
-        <p:cTn id="1" dur="indefinite" restart="never" nodeType="tmRoot"/>
-      </p:par>
-    </p:tnLst>
-  </p:timing>
-</p:sld>
-</file>
-
-<file path=ppt/slides/slide3.xml><?xml version="1.0" encoding="utf-8"?>
-<p:sld xmlns:a="http://schemas.openxmlformats.org/drawingml/2006/main" xmlns:r="http://schemas.openxmlformats.org/officeDocument/2006/relationships" xmlns:p="http://schemas.openxmlformats.org/presentationml/2006/main">
-  <p:cSld>
-    <p:spTree>
-      <p:nvGrpSpPr>
-        <p:cNvPr id="1" name=""/>
-        <p:cNvGrpSpPr/>
-        <p:nvPr/>
-      </p:nvGrpSpPr>
-      <p:grpSpPr>
-        <a:xfrm>
-          <a:off x="0" y="0"/>
-          <a:ext cx="0" cy="0"/>
-          <a:chOff x="0" y="0"/>
-          <a:chExt cx="0" cy="0"/>
-        </a:xfrm>
-      </p:grpSpPr>
-      <p:sp>
-        <p:nvSpPr>
-          <p:cNvPr id="2" name="Title 1"/>
-          <p:cNvSpPr>
-            <a:spLocks noGrp="1"/>
-          </p:cNvSpPr>
-          <p:nvPr>
-            <p:ph type="title"/>
-          </p:nvPr>
-        </p:nvSpPr>
-        <p:spPr/>
-        <p:txBody>
-          <a:bodyPr/>
-          <a:lstStyle/>
-          <a:p>
-            <a:r>
-              <a:rPr lang="en-US" dirty="0" smtClean="0"/>
-              <a:t>MVVM</a:t>
-            </a:r>
-            <a:endParaRPr lang="en-US" dirty="0"/>
-          </a:p>
-        </p:txBody>
-      </p:sp>
-      <p:pic>
-        <p:nvPicPr>
-          <p:cNvPr id="23" name="Content Placeholder 22"/>
-          <p:cNvPicPr>
-            <a:picLocks noGrp="1" noChangeAspect="1"/>
-          </p:cNvPicPr>
-          <p:nvPr>
-            <p:ph idx="1"/>
-          </p:nvPr>
-        </p:nvPicPr>
-        <p:blipFill>
-          <a:blip r:embed="rId3"/>
-          <a:stretch>
-            <a:fillRect/>
-          </a:stretch>
-        </p:blipFill>
-        <p:spPr>
-          <a:xfrm>
-            <a:off x="910897" y="1417638"/>
-            <a:ext cx="10569903" cy="3781342"/>
-          </a:xfrm>
-          <a:prstGeom prst="rect">
-            <a:avLst/>
-          </a:prstGeom>
-        </p:spPr>
-      </p:pic>
-    </p:spTree>
-    <p:extLst>
-      <p:ext uri="{BB962C8B-B14F-4D97-AF65-F5344CB8AC3E}">
-        <p14:creationId xmlns:p14="http://schemas.microsoft.com/office/powerpoint/2010/main" val="2048388921"/>
       </p:ext>
     </p:extLst>
   </p:cSld>
@@ -9578,33 +9974,10 @@
             <p:ph type="title"/>
           </p:nvPr>
         </p:nvSpPr>
-        <p:spPr/>
-        <p:txBody>
-          <a:bodyPr/>
-          <a:lstStyle/>
-          <a:p>
-            <a:r>
-              <a:rPr lang="en-US" dirty="0" smtClean="0"/>
-              <a:t>Scalable Framework</a:t>
-            </a:r>
-            <a:endParaRPr lang="en-US" dirty="0"/>
-          </a:p>
-        </p:txBody>
-      </p:sp>
-      <p:sp>
-        <p:nvSpPr>
-          <p:cNvPr id="3" name="Content Placeholder 2"/>
-          <p:cNvSpPr>
-            <a:spLocks noGrp="1"/>
-          </p:cNvSpPr>
-          <p:nvPr>
-            <p:ph idx="1"/>
-          </p:nvPr>
-        </p:nvSpPr>
         <p:spPr>
           <a:xfrm>
-            <a:off x="1727200" y="1581151"/>
-            <a:ext cx="9753600" cy="4114800"/>
+            <a:off x="812800" y="274638"/>
+            <a:ext cx="10668000" cy="691277"/>
           </a:xfrm>
         </p:spPr>
         <p:txBody>
@@ -9613,48 +9986,9 @@
           <a:p>
             <a:r>
               <a:rPr lang="en-US" dirty="0" smtClean="0"/>
-              <a:t>Separation of concerns</a:t>
-            </a:r>
-          </a:p>
-          <a:p>
-            <a:r>
-              <a:rPr lang="en-US" dirty="0" smtClean="0"/>
-              <a:t>Lazy load resources</a:t>
-            </a:r>
-          </a:p>
-          <a:p>
-            <a:r>
-              <a:rPr lang="en-US" dirty="0" smtClean="0"/>
-              <a:t>Based on Boilerplate.js</a:t>
-            </a:r>
-          </a:p>
-          <a:p>
-            <a:pPr lvl="1"/>
-            <a:r>
-              <a:rPr lang="en-US" dirty="0" smtClean="0"/>
-              <a:t>Thin</a:t>
-            </a:r>
-          </a:p>
-          <a:p>
-            <a:pPr lvl="1"/>
-            <a:r>
-              <a:rPr lang="en-US" dirty="0" smtClean="0"/>
-              <a:t>Full control</a:t>
-            </a:r>
-          </a:p>
-          <a:p>
-            <a:pPr lvl="1"/>
-            <a:r>
-              <a:rPr lang="en-US" dirty="0" smtClean="0"/>
-              <a:t>Configuration based</a:t>
-            </a:r>
-          </a:p>
-          <a:p>
-            <a:pPr lvl="1"/>
-            <a:r>
-              <a:rPr lang="en-US" dirty="0" smtClean="0"/>
-              <a:t>Takes over routing</a:t>
-            </a:r>
+              <a:t>Project Structure</a:t>
+            </a:r>
+            <a:endParaRPr lang="en-US" dirty="0"/>
           </a:p>
         </p:txBody>
       </p:sp>
@@ -9666,15 +10000,16 @@
           </p:cNvPicPr>
           <p:nvPr/>
         </p:nvPicPr>
-        <p:blipFill rotWithShape="1">
-          <a:blip r:embed="rId3"/>
-          <a:srcRect l="15544" t="12070" r="4296" b="16997"/>
-          <a:stretch/>
+        <p:blipFill>
+          <a:blip r:embed="rId2"/>
+          <a:stretch>
+            <a:fillRect/>
+          </a:stretch>
         </p:blipFill>
         <p:spPr>
           <a:xfrm>
-            <a:off x="5834129" y="1001333"/>
-            <a:ext cx="4584880" cy="5687918"/>
+            <a:off x="4198445" y="965915"/>
+            <a:ext cx="4095549" cy="4841702"/>
           </a:xfrm>
           <a:prstGeom prst="rect">
             <a:avLst/>
@@ -9684,20 +10019,13 @@
     </p:spTree>
     <p:extLst>
       <p:ext uri="{BB962C8B-B14F-4D97-AF65-F5344CB8AC3E}">
-        <p14:creationId xmlns:p14="http://schemas.microsoft.com/office/powerpoint/2010/main" val="2481330942"/>
+        <p14:creationId xmlns:p14="http://schemas.microsoft.com/office/powerpoint/2010/main" val="179063040"/>
       </p:ext>
     </p:extLst>
   </p:cSld>
   <p:clrMapOvr>
     <a:masterClrMapping/>
   </p:clrMapOvr>
-  <p:timing>
-    <p:tnLst>
-      <p:par>
-        <p:cTn id="1" dur="indefinite" restart="never" nodeType="tmRoot"/>
-      </p:par>
-    </p:tnLst>
-  </p:timing>
 </p:sld>
 </file>
 
@@ -10605,7 +10933,7 @@
   </a:extraClrSchemeLst>
   <a:extLst>
     <a:ext uri="{05A4C25C-085E-4340-85A3-A5531E510DB2}">
-      <thm15:themeFamily xmlns:thm15="http://schemas.microsoft.com/office/thememl/2012/main" xmlns="" name="Excella" id="{9A5F6432-036B-4B94-AD11-BE20D0494622}" vid="{7466CE9E-D5DB-4024-BB33-EA4F022184C8}"/>
+      <thm15:themeFamily xmlns:thm15="http://schemas.microsoft.com/office/thememl/2012/main" name="Excella" id="{9A5F6432-036B-4B94-AD11-BE20D0494622}" vid="{7466CE9E-D5DB-4024-BB33-EA4F022184C8}"/>
     </a:ext>
   </a:extLst>
 </a:theme>
@@ -10866,7 +11194,7 @@
   <a:extraClrSchemeLst/>
   <a:extLst>
     <a:ext uri="{05A4C25C-085E-4340-85A3-A5531E510DB2}">
-      <thm15:themeFamily xmlns:thm15="http://schemas.microsoft.com/office/thememl/2012/main" xmlns="" name="Office Theme" id="{62F939B6-93AF-4DB8-9C6B-D6C7DFDC589F}" vid="{4A3C46E8-61CC-4603-A589-7422A47A8E4A}"/>
+      <thm15:themeFamily xmlns:thm15="http://schemas.microsoft.com/office/thememl/2012/main" name="Office Theme" id="{62F939B6-93AF-4DB8-9C6B-D6C7DFDC589F}" vid="{4A3C46E8-61CC-4603-A589-7422A47A8E4A}"/>
     </a:ext>
   </a:extLst>
 </a:theme>
@@ -11127,7 +11455,7 @@
   <a:extraClrSchemeLst/>
   <a:extLst>
     <a:ext uri="{05A4C25C-085E-4340-85A3-A5531E510DB2}">
-      <thm15:themeFamily xmlns:thm15="http://schemas.microsoft.com/office/thememl/2012/main" xmlns="" name="Office Theme" id="{62F939B6-93AF-4DB8-9C6B-D6C7DFDC589F}" vid="{4A3C46E8-61CC-4603-A589-7422A47A8E4A}"/>
+      <thm15:themeFamily xmlns:thm15="http://schemas.microsoft.com/office/thememl/2012/main" name="Office Theme" id="{62F939B6-93AF-4DB8-9C6B-D6C7DFDC589F}" vid="{4A3C46E8-61CC-4603-A589-7422A47A8E4A}"/>
     </a:ext>
   </a:extLst>
 </a:theme>

</xml_diff>